<commit_message>
2025-10-16- Nuova lista con colori, apertura PDF (windows con acrobat Android con visore interno), schermo per i test di apertura vari, menu'  con mantenimento degli stati
</commit_message>
<xml_diff>
--- a/Assets/SfondoLibriRBeAeb.pptx
+++ b/Assets/SfondoLibriRBeAeb.pptx
@@ -6,6 +6,7 @@
   </p:sldMasterIdLst>
   <p:sldIdLst>
     <p:sldId id="256" r:id="rId2"/>
+    <p:sldId id="257" r:id="rId3"/>
   </p:sldIdLst>
   <p:sldSz cx="12192000" cy="6858000"/>
   <p:notesSz cx="6797675" cy="9928225"/>
@@ -243,7 +244,7 @@
           <a:p>
             <a:fld id="{9AEB6F18-8A03-48AB-8ECC-23A9802CB05F}" type="datetimeFigureOut">
               <a:rPr lang="it-IT" smtClean="0"/>
-              <a:t>03/08/2025</a:t>
+              <a:t>14/10/2025</a:t>
             </a:fld>
             <a:endParaRPr lang="it-IT"/>
           </a:p>
@@ -413,7 +414,7 @@
           <a:p>
             <a:fld id="{9AEB6F18-8A03-48AB-8ECC-23A9802CB05F}" type="datetimeFigureOut">
               <a:rPr lang="it-IT" smtClean="0"/>
-              <a:t>03/08/2025</a:t>
+              <a:t>14/10/2025</a:t>
             </a:fld>
             <a:endParaRPr lang="it-IT"/>
           </a:p>
@@ -593,7 +594,7 @@
           <a:p>
             <a:fld id="{9AEB6F18-8A03-48AB-8ECC-23A9802CB05F}" type="datetimeFigureOut">
               <a:rPr lang="it-IT" smtClean="0"/>
-              <a:t>03/08/2025</a:t>
+              <a:t>14/10/2025</a:t>
             </a:fld>
             <a:endParaRPr lang="it-IT"/>
           </a:p>
@@ -763,7 +764,7 @@
           <a:p>
             <a:fld id="{9AEB6F18-8A03-48AB-8ECC-23A9802CB05F}" type="datetimeFigureOut">
               <a:rPr lang="it-IT" smtClean="0"/>
-              <a:t>03/08/2025</a:t>
+              <a:t>14/10/2025</a:t>
             </a:fld>
             <a:endParaRPr lang="it-IT"/>
           </a:p>
@@ -1009,7 +1010,7 @@
           <a:p>
             <a:fld id="{9AEB6F18-8A03-48AB-8ECC-23A9802CB05F}" type="datetimeFigureOut">
               <a:rPr lang="it-IT" smtClean="0"/>
-              <a:t>03/08/2025</a:t>
+              <a:t>14/10/2025</a:t>
             </a:fld>
             <a:endParaRPr lang="it-IT"/>
           </a:p>
@@ -1241,7 +1242,7 @@
           <a:p>
             <a:fld id="{9AEB6F18-8A03-48AB-8ECC-23A9802CB05F}" type="datetimeFigureOut">
               <a:rPr lang="it-IT" smtClean="0"/>
-              <a:t>03/08/2025</a:t>
+              <a:t>14/10/2025</a:t>
             </a:fld>
             <a:endParaRPr lang="it-IT"/>
           </a:p>
@@ -1608,7 +1609,7 @@
           <a:p>
             <a:fld id="{9AEB6F18-8A03-48AB-8ECC-23A9802CB05F}" type="datetimeFigureOut">
               <a:rPr lang="it-IT" smtClean="0"/>
-              <a:t>03/08/2025</a:t>
+              <a:t>14/10/2025</a:t>
             </a:fld>
             <a:endParaRPr lang="it-IT"/>
           </a:p>
@@ -1726,7 +1727,7 @@
           <a:p>
             <a:fld id="{9AEB6F18-8A03-48AB-8ECC-23A9802CB05F}" type="datetimeFigureOut">
               <a:rPr lang="it-IT" smtClean="0"/>
-              <a:t>03/08/2025</a:t>
+              <a:t>14/10/2025</a:t>
             </a:fld>
             <a:endParaRPr lang="it-IT"/>
           </a:p>
@@ -1821,7 +1822,7 @@
           <a:p>
             <a:fld id="{9AEB6F18-8A03-48AB-8ECC-23A9802CB05F}" type="datetimeFigureOut">
               <a:rPr lang="it-IT" smtClean="0"/>
-              <a:t>03/08/2025</a:t>
+              <a:t>14/10/2025</a:t>
             </a:fld>
             <a:endParaRPr lang="it-IT"/>
           </a:p>
@@ -2098,7 +2099,7 @@
           <a:p>
             <a:fld id="{9AEB6F18-8A03-48AB-8ECC-23A9802CB05F}" type="datetimeFigureOut">
               <a:rPr lang="it-IT" smtClean="0"/>
-              <a:t>03/08/2025</a:t>
+              <a:t>14/10/2025</a:t>
             </a:fld>
             <a:endParaRPr lang="it-IT"/>
           </a:p>
@@ -2351,7 +2352,7 @@
           <a:p>
             <a:fld id="{9AEB6F18-8A03-48AB-8ECC-23A9802CB05F}" type="datetimeFigureOut">
               <a:rPr lang="it-IT" smtClean="0"/>
-              <a:t>03/08/2025</a:t>
+              <a:t>14/10/2025</a:t>
             </a:fld>
             <a:endParaRPr lang="it-IT"/>
           </a:p>
@@ -2564,7 +2565,7 @@
           <a:p>
             <a:fld id="{9AEB6F18-8A03-48AB-8ECC-23A9802CB05F}" type="datetimeFigureOut">
               <a:rPr lang="it-IT" smtClean="0"/>
-              <a:t>03/08/2025</a:t>
+              <a:t>14/10/2025</a:t>
             </a:fld>
             <a:endParaRPr lang="it-IT"/>
           </a:p>
@@ -3187,6 +3188,218 @@
 </p:sld>
 </file>
 
+<file path=ppt/slides/slide2.xml><?xml version="1.0" encoding="utf-8"?>
+<p:sld xmlns:a="http://schemas.openxmlformats.org/drawingml/2006/main" xmlns:r="http://schemas.openxmlformats.org/officeDocument/2006/relationships" xmlns:p="http://schemas.openxmlformats.org/presentationml/2006/main">
+  <p:cSld>
+    <p:spTree>
+      <p:nvGrpSpPr>
+        <p:cNvPr id="1" name=""/>
+        <p:cNvGrpSpPr/>
+        <p:nvPr/>
+      </p:nvGrpSpPr>
+      <p:grpSpPr>
+        <a:xfrm>
+          <a:off x="0" y="0"/>
+          <a:ext cx="0" cy="0"/>
+          <a:chOff x="0" y="0"/>
+          <a:chExt cx="0" cy="0"/>
+        </a:xfrm>
+      </p:grpSpPr>
+      <p:pic>
+        <p:nvPicPr>
+          <p:cNvPr id="7" name="Immagine 6"/>
+          <p:cNvPicPr>
+            <a:picLocks noChangeAspect="1"/>
+          </p:cNvPicPr>
+          <p:nvPr/>
+        </p:nvPicPr>
+        <p:blipFill>
+          <a:blip r:embed="rId2">
+            <a:extLst>
+              <a:ext uri="{28A0092B-C50C-407E-A947-70E740481C1C}">
+                <a14:useLocalDpi xmlns:a14="http://schemas.microsoft.com/office/drawing/2010/main" val="0"/>
+              </a:ext>
+            </a:extLst>
+          </a:blip>
+          <a:stretch>
+            <a:fillRect/>
+          </a:stretch>
+        </p:blipFill>
+        <p:spPr>
+          <a:xfrm>
+            <a:off x="-141960" y="0"/>
+            <a:ext cx="12191998" cy="6858000"/>
+          </a:xfrm>
+          <a:prstGeom prst="rect">
+            <a:avLst/>
+          </a:prstGeom>
+          <a:gradFill>
+            <a:gsLst>
+              <a:gs pos="34512">
+                <a:srgbClr val="DEEBF6"/>
+              </a:gs>
+              <a:gs pos="10000">
+                <a:schemeClr val="accent1">
+                  <a:lumMod val="5000"/>
+                  <a:lumOff val="95000"/>
+                </a:schemeClr>
+              </a:gs>
+              <a:gs pos="74000">
+                <a:schemeClr val="accent1">
+                  <a:lumMod val="45000"/>
+                  <a:lumOff val="55000"/>
+                </a:schemeClr>
+              </a:gs>
+              <a:gs pos="83000">
+                <a:schemeClr val="accent1">
+                  <a:lumMod val="45000"/>
+                  <a:lumOff val="55000"/>
+                </a:schemeClr>
+              </a:gs>
+              <a:gs pos="100000">
+                <a:schemeClr val="accent1">
+                  <a:lumMod val="30000"/>
+                  <a:lumOff val="70000"/>
+                </a:schemeClr>
+              </a:gs>
+            </a:gsLst>
+            <a:lin ang="5400000" scaled="1"/>
+          </a:gradFill>
+        </p:spPr>
+      </p:pic>
+      <p:sp>
+        <p:nvSpPr>
+          <p:cNvPr id="2" name="Titolo 1"/>
+          <p:cNvSpPr>
+            <a:spLocks noGrp="1"/>
+          </p:cNvSpPr>
+          <p:nvPr>
+            <p:ph type="ctrTitle"/>
+          </p:nvPr>
+        </p:nvSpPr>
+        <p:spPr/>
+        <p:txBody>
+          <a:bodyPr/>
+          <a:lstStyle/>
+          <a:p>
+            <a:endParaRPr lang="it-IT" dirty="0"/>
+          </a:p>
+        </p:txBody>
+      </p:sp>
+      <p:sp>
+        <p:nvSpPr>
+          <p:cNvPr id="3" name="Sottotitolo 2"/>
+          <p:cNvSpPr>
+            <a:spLocks noGrp="1"/>
+          </p:cNvSpPr>
+          <p:nvPr>
+            <p:ph type="subTitle" idx="1"/>
+          </p:nvPr>
+        </p:nvSpPr>
+        <p:spPr/>
+        <p:txBody>
+          <a:bodyPr/>
+          <a:lstStyle/>
+          <a:p>
+            <a:endParaRPr lang="it-IT" dirty="0"/>
+          </a:p>
+        </p:txBody>
+      </p:sp>
+      <p:grpSp>
+        <p:nvGrpSpPr>
+          <p:cNvPr id="5" name="Gruppo 4"/>
+          <p:cNvGrpSpPr/>
+          <p:nvPr/>
+        </p:nvGrpSpPr>
+        <p:grpSpPr>
+          <a:xfrm>
+            <a:off x="2016690" y="5621817"/>
+            <a:ext cx="6973909" cy="1357522"/>
+            <a:chOff x="2029216" y="5651950"/>
+            <a:chExt cx="6973909" cy="1357522"/>
+          </a:xfrm>
+        </p:grpSpPr>
+        <p:pic>
+          <p:nvPicPr>
+            <p:cNvPr id="4" name="Immagine 3"/>
+            <p:cNvPicPr>
+              <a:picLocks noChangeAspect="1"/>
+            </p:cNvPicPr>
+            <p:nvPr/>
+          </p:nvPicPr>
+          <p:blipFill>
+            <a:blip r:embed="rId3" cstate="print">
+              <a:extLst>
+                <a:ext uri="{28A0092B-C50C-407E-A947-70E740481C1C}">
+                  <a14:useLocalDpi xmlns:a14="http://schemas.microsoft.com/office/drawing/2010/main" val="0"/>
+                </a:ext>
+              </a:extLst>
+            </a:blip>
+            <a:stretch>
+              <a:fillRect/>
+            </a:stretch>
+          </p:blipFill>
+          <p:spPr>
+            <a:xfrm>
+              <a:off x="5570994" y="5651950"/>
+              <a:ext cx="3432131" cy="1357522"/>
+            </a:xfrm>
+            <a:prstGeom prst="rect">
+              <a:avLst/>
+            </a:prstGeom>
+          </p:spPr>
+        </p:pic>
+        <p:pic>
+          <p:nvPicPr>
+            <p:cNvPr id="6" name="Immagine 5"/>
+            <p:cNvPicPr>
+              <a:picLocks noChangeAspect="1"/>
+            </p:cNvPicPr>
+            <p:nvPr/>
+          </p:nvPicPr>
+          <p:blipFill>
+            <a:blip r:embed="rId4" cstate="print">
+              <a:extLst>
+                <a:ext uri="{28A0092B-C50C-407E-A947-70E740481C1C}">
+                  <a14:useLocalDpi xmlns:a14="http://schemas.microsoft.com/office/drawing/2010/main" val="0"/>
+                </a:ext>
+              </a:extLst>
+            </a:blip>
+            <a:stretch>
+              <a:fillRect/>
+            </a:stretch>
+          </p:blipFill>
+          <p:spPr>
+            <a:xfrm>
+              <a:off x="2029216" y="5651950"/>
+              <a:ext cx="3541778" cy="1206050"/>
+            </a:xfrm>
+            <a:prstGeom prst="rect">
+              <a:avLst/>
+            </a:prstGeom>
+          </p:spPr>
+        </p:pic>
+      </p:grpSp>
+    </p:spTree>
+    <p:extLst>
+      <p:ext uri="{BB962C8B-B14F-4D97-AF65-F5344CB8AC3E}">
+        <p14:creationId xmlns:p14="http://schemas.microsoft.com/office/powerpoint/2010/main" val="1456927661"/>
+      </p:ext>
+    </p:extLst>
+  </p:cSld>
+  <p:clrMapOvr>
+    <a:masterClrMapping/>
+  </p:clrMapOvr>
+  <p:timing>
+    <p:tnLst>
+      <p:par>
+        <p:cTn id="1" dur="indefinite" restart="never" nodeType="tmRoot"/>
+      </p:par>
+    </p:tnLst>
+  </p:timing>
+</p:sld>
+</file>
+
 <file path=ppt/theme/theme1.xml><?xml version="1.0" encoding="utf-8"?>
 <a:theme xmlns:a="http://schemas.openxmlformats.org/drawingml/2006/main" name="Tema di Office">
   <a:themeElements>

</xml_diff>